<commit_message>
retire ":" dans freq
</commit_message>
<xml_diff>
--- a/Presentation.pptx
+++ b/Presentation.pptx
@@ -570,6 +570,471 @@
   </mc:AlternateContent>
   <c:chart>
     <c:title>
+      <c:overlay val="0"/>
+      <c:spPr>
+        <a:noFill/>
+        <a:ln>
+          <a:noFill/>
+        </a:ln>
+        <a:effectLst/>
+      </c:spPr>
+      <c:txPr>
+        <a:bodyPr rot="0" spcFirstLastPara="1" vertOverflow="ellipsis" vert="horz" wrap="square" anchor="ctr" anchorCtr="1"/>
+        <a:lstStyle/>
+        <a:p>
+          <a:pPr>
+            <a:defRPr sz="1400" b="0" i="0" u="none" strike="noStrike" kern="1200" spc="0" baseline="0">
+              <a:solidFill>
+                <a:schemeClr val="tx1">
+                  <a:lumMod val="65000"/>
+                  <a:lumOff val="35000"/>
+                </a:schemeClr>
+              </a:solidFill>
+              <a:latin typeface="+mn-lt"/>
+              <a:ea typeface="+mn-ea"/>
+              <a:cs typeface="+mn-cs"/>
+            </a:defRPr>
+          </a:pPr>
+          <a:endParaRPr lang="fr-FR"/>
+        </a:p>
+      </c:txPr>
+    </c:title>
+    <c:autoTitleDeleted val="0"/>
+    <c:plotArea>
+      <c:layout/>
+      <c:pieChart>
+        <c:varyColors val="1"/>
+        <c:ser>
+          <c:idx val="0"/>
+          <c:order val="0"/>
+          <c:tx>
+            <c:strRef>
+              <c:f>Feuil1!$A$2</c:f>
+              <c:strCache>
+                <c:ptCount val="1"/>
+                <c:pt idx="0">
+                  <c:v>Bonjour</c:v>
+                </c:pt>
+              </c:strCache>
+            </c:strRef>
+          </c:tx>
+          <c:dPt>
+            <c:idx val="0"/>
+            <c:bubble3D val="0"/>
+            <c:spPr>
+              <a:solidFill>
+                <a:schemeClr val="accent1"/>
+              </a:solidFill>
+              <a:ln w="19050">
+                <a:solidFill>
+                  <a:schemeClr val="lt1"/>
+                </a:solidFill>
+              </a:ln>
+              <a:effectLst/>
+            </c:spPr>
+            <c:extLst>
+              <c:ext xmlns:c16="http://schemas.microsoft.com/office/drawing/2014/chart" uri="{C3380CC4-5D6E-409C-BE32-E72D297353CC}">
+                <c16:uniqueId val="{00000001-FA29-442F-8F52-F3D3360660E0}"/>
+              </c:ext>
+            </c:extLst>
+          </c:dPt>
+          <c:dPt>
+            <c:idx val="1"/>
+            <c:bubble3D val="0"/>
+            <c:spPr>
+              <a:solidFill>
+                <a:schemeClr val="accent2"/>
+              </a:solidFill>
+              <a:ln w="19050">
+                <a:solidFill>
+                  <a:schemeClr val="lt1"/>
+                </a:solidFill>
+              </a:ln>
+              <a:effectLst/>
+            </c:spPr>
+            <c:extLst>
+              <c:ext xmlns:c16="http://schemas.microsoft.com/office/drawing/2014/chart" uri="{C3380CC4-5D6E-409C-BE32-E72D297353CC}">
+                <c16:uniqueId val="{00000003-FA29-442F-8F52-F3D3360660E0}"/>
+              </c:ext>
+            </c:extLst>
+          </c:dPt>
+          <c:dPt>
+            <c:idx val="2"/>
+            <c:bubble3D val="0"/>
+            <c:spPr>
+              <a:solidFill>
+                <a:schemeClr val="accent3"/>
+              </a:solidFill>
+              <a:ln w="19050">
+                <a:solidFill>
+                  <a:schemeClr val="lt1"/>
+                </a:solidFill>
+              </a:ln>
+              <a:effectLst/>
+            </c:spPr>
+            <c:extLst>
+              <c:ext xmlns:c16="http://schemas.microsoft.com/office/drawing/2014/chart" uri="{C3380CC4-5D6E-409C-BE32-E72D297353CC}">
+                <c16:uniqueId val="{00000005-FA29-442F-8F52-F3D3360660E0}"/>
+              </c:ext>
+            </c:extLst>
+          </c:dPt>
+          <c:cat>
+            <c:strRef>
+              <c:f>Feuil1!$B$1:$D$1</c:f>
+              <c:strCache>
+                <c:ptCount val="3"/>
+                <c:pt idx="0">
+                  <c:v>Original</c:v>
+                </c:pt>
+                <c:pt idx="1">
+                  <c:v>Compressé</c:v>
+                </c:pt>
+                <c:pt idx="2">
+                  <c:v>Fréquences</c:v>
+                </c:pt>
+              </c:strCache>
+            </c:strRef>
+          </c:cat>
+          <c:val>
+            <c:numRef>
+              <c:f>Feuil1!$B$2:$D$2</c:f>
+              <c:numCache>
+                <c:formatCode>General</c:formatCode>
+                <c:ptCount val="3"/>
+                <c:pt idx="0">
+                  <c:v>9</c:v>
+                </c:pt>
+                <c:pt idx="1">
+                  <c:v>4</c:v>
+                </c:pt>
+                <c:pt idx="2">
+                  <c:v>36</c:v>
+                </c:pt>
+              </c:numCache>
+            </c:numRef>
+          </c:val>
+          <c:extLst>
+            <c:ext xmlns:c16="http://schemas.microsoft.com/office/drawing/2014/chart" uri="{C3380CC4-5D6E-409C-BE32-E72D297353CC}">
+              <c16:uniqueId val="{00000006-FA29-442F-8F52-F3D3360660E0}"/>
+            </c:ext>
+          </c:extLst>
+        </c:ser>
+        <c:dLbls>
+          <c:showLegendKey val="0"/>
+          <c:showVal val="0"/>
+          <c:showCatName val="0"/>
+          <c:showSerName val="0"/>
+          <c:showPercent val="0"/>
+          <c:showBubbleSize val="0"/>
+          <c:showLeaderLines val="1"/>
+        </c:dLbls>
+        <c:firstSliceAng val="0"/>
+      </c:pieChart>
+      <c:spPr>
+        <a:noFill/>
+        <a:ln>
+          <a:noFill/>
+        </a:ln>
+        <a:effectLst/>
+      </c:spPr>
+    </c:plotArea>
+    <c:plotVisOnly val="1"/>
+    <c:dispBlanksAs val="gap"/>
+    <c:extLst>
+      <c:ext xmlns:c16r3="http://schemas.microsoft.com/office/drawing/2017/03/chart" uri="{56B9EC1D-385E-4148-901F-78D8002777C0}">
+        <c16r3:dataDisplayOptions16>
+          <c16r3:dispNaAsBlank val="1"/>
+        </c16r3:dataDisplayOptions16>
+      </c:ext>
+    </c:extLst>
+    <c:showDLblsOverMax val="0"/>
+  </c:chart>
+  <c:spPr>
+    <a:noFill/>
+    <a:ln>
+      <a:noFill/>
+    </a:ln>
+    <a:effectLst/>
+  </c:spPr>
+  <c:txPr>
+    <a:bodyPr/>
+    <a:lstStyle/>
+    <a:p>
+      <a:pPr>
+        <a:defRPr/>
+      </a:pPr>
+      <a:endParaRPr lang="fr-FR"/>
+    </a:p>
+  </c:txPr>
+  <c:externalData r:id="rId3">
+    <c:autoUpdate val="0"/>
+  </c:externalData>
+</c:chartSpace>
+</file>
+
+<file path=ppt/charts/chart2.xml><?xml version="1.0" encoding="utf-8"?>
+<c:chartSpace xmlns:c="http://schemas.openxmlformats.org/drawingml/2006/chart" xmlns:a="http://schemas.openxmlformats.org/drawingml/2006/main" xmlns:r="http://schemas.openxmlformats.org/officeDocument/2006/relationships" xmlns:c16r2="http://schemas.microsoft.com/office/drawing/2015/06/chart">
+  <c:date1904 val="0"/>
+  <c:lang val="fr-FR"/>
+  <c:roundedCorners val="0"/>
+  <mc:AlternateContent xmlns:mc="http://schemas.openxmlformats.org/markup-compatibility/2006">
+    <mc:Choice xmlns:c14="http://schemas.microsoft.com/office/drawing/2007/8/2/chart" Requires="c14">
+      <c14:style val="102"/>
+    </mc:Choice>
+    <mc:Fallback>
+      <c:style val="2"/>
+    </mc:Fallback>
+  </mc:AlternateContent>
+  <c:chart>
+    <c:title>
+      <c:overlay val="0"/>
+      <c:spPr>
+        <a:noFill/>
+        <a:ln>
+          <a:noFill/>
+        </a:ln>
+        <a:effectLst/>
+      </c:spPr>
+      <c:txPr>
+        <a:bodyPr rot="0" spcFirstLastPara="1" vertOverflow="ellipsis" vert="horz" wrap="square" anchor="ctr" anchorCtr="1"/>
+        <a:lstStyle/>
+        <a:p>
+          <a:pPr>
+            <a:defRPr sz="1400" b="0" i="0" u="none" strike="noStrike" kern="1200" spc="0" baseline="0">
+              <a:solidFill>
+                <a:schemeClr val="tx1">
+                  <a:lumMod val="65000"/>
+                  <a:lumOff val="35000"/>
+                </a:schemeClr>
+              </a:solidFill>
+              <a:latin typeface="+mn-lt"/>
+              <a:ea typeface="+mn-ea"/>
+              <a:cs typeface="+mn-cs"/>
+            </a:defRPr>
+          </a:pPr>
+          <a:endParaRPr lang="fr-FR"/>
+        </a:p>
+      </c:txPr>
+    </c:title>
+    <c:autoTitleDeleted val="0"/>
+    <c:plotArea>
+      <c:layout/>
+      <c:pieChart>
+        <c:varyColors val="1"/>
+        <c:ser>
+          <c:idx val="0"/>
+          <c:order val="0"/>
+          <c:tx>
+            <c:strRef>
+              <c:f>Feuil1!$A$6</c:f>
+              <c:strCache>
+                <c:ptCount val="1"/>
+                <c:pt idx="0">
+                  <c:v>Alice</c:v>
+                </c:pt>
+              </c:strCache>
+            </c:strRef>
+          </c:tx>
+          <c:dPt>
+            <c:idx val="0"/>
+            <c:bubble3D val="0"/>
+            <c:spPr>
+              <a:solidFill>
+                <a:schemeClr val="accent1"/>
+              </a:solidFill>
+              <a:ln w="19050">
+                <a:solidFill>
+                  <a:schemeClr val="lt1"/>
+                </a:solidFill>
+              </a:ln>
+              <a:effectLst/>
+            </c:spPr>
+            <c:extLst>
+              <c:ext xmlns:c16="http://schemas.microsoft.com/office/drawing/2014/chart" uri="{C3380CC4-5D6E-409C-BE32-E72D297353CC}">
+                <c16:uniqueId val="{00000001-4009-4371-BA80-64A15AE1DDE7}"/>
+              </c:ext>
+            </c:extLst>
+          </c:dPt>
+          <c:dPt>
+            <c:idx val="1"/>
+            <c:bubble3D val="0"/>
+            <c:spPr>
+              <a:solidFill>
+                <a:schemeClr val="accent2"/>
+              </a:solidFill>
+              <a:ln w="19050">
+                <a:solidFill>
+                  <a:schemeClr val="lt1"/>
+                </a:solidFill>
+              </a:ln>
+              <a:effectLst/>
+            </c:spPr>
+            <c:extLst>
+              <c:ext xmlns:c16="http://schemas.microsoft.com/office/drawing/2014/chart" uri="{C3380CC4-5D6E-409C-BE32-E72D297353CC}">
+                <c16:uniqueId val="{00000003-4009-4371-BA80-64A15AE1DDE7}"/>
+              </c:ext>
+            </c:extLst>
+          </c:dPt>
+          <c:dPt>
+            <c:idx val="2"/>
+            <c:bubble3D val="0"/>
+            <c:spPr>
+              <a:solidFill>
+                <a:schemeClr val="accent3"/>
+              </a:solidFill>
+              <a:ln w="19050">
+                <a:solidFill>
+                  <a:schemeClr val="lt1"/>
+                </a:solidFill>
+              </a:ln>
+              <a:effectLst/>
+            </c:spPr>
+            <c:extLst>
+              <c:ext xmlns:c16="http://schemas.microsoft.com/office/drawing/2014/chart" uri="{C3380CC4-5D6E-409C-BE32-E72D297353CC}">
+                <c16:uniqueId val="{00000005-4009-4371-BA80-64A15AE1DDE7}"/>
+              </c:ext>
+            </c:extLst>
+          </c:dPt>
+          <c:cat>
+            <c:strRef>
+              <c:f>Feuil1!$B$1:$D$1</c:f>
+              <c:strCache>
+                <c:ptCount val="3"/>
+                <c:pt idx="0">
+                  <c:v>Original</c:v>
+                </c:pt>
+                <c:pt idx="1">
+                  <c:v>Compressé</c:v>
+                </c:pt>
+                <c:pt idx="2">
+                  <c:v>Fréquences</c:v>
+                </c:pt>
+              </c:strCache>
+            </c:strRef>
+          </c:cat>
+          <c:val>
+            <c:numRef>
+              <c:f>Feuil1!$B$6:$D$6</c:f>
+              <c:numCache>
+                <c:formatCode>General</c:formatCode>
+                <c:ptCount val="3"/>
+                <c:pt idx="0">
+                  <c:v>152089</c:v>
+                </c:pt>
+                <c:pt idx="1">
+                  <c:v>84787</c:v>
+                </c:pt>
+                <c:pt idx="2">
+                  <c:v>507</c:v>
+                </c:pt>
+              </c:numCache>
+            </c:numRef>
+          </c:val>
+          <c:extLst>
+            <c:ext xmlns:c16="http://schemas.microsoft.com/office/drawing/2014/chart" uri="{C3380CC4-5D6E-409C-BE32-E72D297353CC}">
+              <c16:uniqueId val="{00000006-4009-4371-BA80-64A15AE1DDE7}"/>
+            </c:ext>
+          </c:extLst>
+        </c:ser>
+        <c:dLbls>
+          <c:showLegendKey val="0"/>
+          <c:showVal val="0"/>
+          <c:showCatName val="0"/>
+          <c:showSerName val="0"/>
+          <c:showPercent val="0"/>
+          <c:showBubbleSize val="0"/>
+          <c:showLeaderLines val="1"/>
+        </c:dLbls>
+        <c:firstSliceAng val="0"/>
+      </c:pieChart>
+      <c:spPr>
+        <a:noFill/>
+        <a:ln>
+          <a:noFill/>
+        </a:ln>
+        <a:effectLst/>
+      </c:spPr>
+    </c:plotArea>
+    <c:legend>
+      <c:legendPos val="b"/>
+      <c:overlay val="0"/>
+      <c:spPr>
+        <a:noFill/>
+        <a:ln>
+          <a:noFill/>
+        </a:ln>
+        <a:effectLst/>
+      </c:spPr>
+      <c:txPr>
+        <a:bodyPr rot="0" spcFirstLastPara="1" vertOverflow="ellipsis" vert="horz" wrap="square" anchor="ctr" anchorCtr="1"/>
+        <a:lstStyle/>
+        <a:p>
+          <a:pPr rtl="0">
+            <a:defRPr sz="900" b="0" i="0" u="none" strike="noStrike" kern="1200" baseline="0">
+              <a:solidFill>
+                <a:schemeClr val="tx1">
+                  <a:lumMod val="65000"/>
+                  <a:lumOff val="35000"/>
+                </a:schemeClr>
+              </a:solidFill>
+              <a:latin typeface="+mn-lt"/>
+              <a:ea typeface="+mn-ea"/>
+              <a:cs typeface="+mn-cs"/>
+            </a:defRPr>
+          </a:pPr>
+          <a:endParaRPr lang="fr-FR"/>
+        </a:p>
+      </c:txPr>
+    </c:legend>
+    <c:plotVisOnly val="1"/>
+    <c:dispBlanksAs val="gap"/>
+    <c:extLst>
+      <c:ext xmlns:c16r3="http://schemas.microsoft.com/office/drawing/2017/03/chart" uri="{56B9EC1D-385E-4148-901F-78D8002777C0}">
+        <c16r3:dataDisplayOptions16>
+          <c16r3:dispNaAsBlank val="1"/>
+        </c16r3:dataDisplayOptions16>
+      </c:ext>
+    </c:extLst>
+    <c:showDLblsOverMax val="0"/>
+  </c:chart>
+  <c:spPr>
+    <a:noFill/>
+    <a:ln>
+      <a:noFill/>
+    </a:ln>
+    <a:effectLst/>
+  </c:spPr>
+  <c:txPr>
+    <a:bodyPr/>
+    <a:lstStyle/>
+    <a:p>
+      <a:pPr>
+        <a:defRPr/>
+      </a:pPr>
+      <a:endParaRPr lang="fr-FR"/>
+    </a:p>
+  </c:txPr>
+  <c:externalData r:id="rId3">
+    <c:autoUpdate val="0"/>
+  </c:externalData>
+</c:chartSpace>
+</file>
+
+<file path=ppt/charts/chart3.xml><?xml version="1.0" encoding="utf-8"?>
+<c:chartSpace xmlns:c="http://schemas.openxmlformats.org/drawingml/2006/chart" xmlns:a="http://schemas.openxmlformats.org/drawingml/2006/main" xmlns:r="http://schemas.openxmlformats.org/officeDocument/2006/relationships" xmlns:c16r2="http://schemas.microsoft.com/office/drawing/2015/06/chart">
+  <c:date1904 val="0"/>
+  <c:lang val="fr-FR"/>
+  <c:roundedCorners val="0"/>
+  <mc:AlternateContent xmlns:mc="http://schemas.openxmlformats.org/markup-compatibility/2006">
+    <mc:Choice xmlns:c14="http://schemas.microsoft.com/office/drawing/2007/8/2/chart" Requires="c14">
+      <c14:style val="102"/>
+    </mc:Choice>
+    <mc:Fallback>
+      <c:style val="2"/>
+    </mc:Fallback>
+  </mc:AlternateContent>
+  <c:chart>
+    <c:title>
       <c:tx>
         <c:rich>
           <a:bodyPr rot="0" spcFirstLastPara="1" vertOverflow="ellipsis" vert="horz" wrap="square" anchor="ctr" anchorCtr="1"/>
@@ -631,7 +1096,17 @@
     </c:title>
     <c:autoTitleDeleted val="0"/>
     <c:plotArea>
-      <c:layout/>
+      <c:layout>
+        <c:manualLayout>
+          <c:layoutTarget val="inner"/>
+          <c:xMode val="edge"/>
+          <c:yMode val="edge"/>
+          <c:x val="7.0131582003576984E-2"/>
+          <c:y val="0.12797872340425534"/>
+          <c:w val="0.91069437669848796"/>
+          <c:h val="0.74835064499916237"/>
+        </c:manualLayout>
+      </c:layout>
       <c:barChart>
         <c:barDir val="col"/>
         <c:grouping val="clustered"/>
@@ -767,7 +1242,7 @@
           </c:val>
           <c:extLst>
             <c:ext xmlns:c16="http://schemas.microsoft.com/office/drawing/2014/chart" uri="{C3380CC4-5D6E-409C-BE32-E72D297353CC}">
-              <c16:uniqueId val="{00000000-1553-4616-B518-3A46265C9329}"/>
+              <c16:uniqueId val="{00000000-8346-4B5F-B626-C3817D6A7C47}"/>
             </c:ext>
           </c:extLst>
         </c:ser>
@@ -853,6 +1328,21 @@
               </c:ext>
             </c:extLst>
           </c:dLbls>
+          <c:trendline>
+            <c:spPr>
+              <a:ln w="19050" cap="rnd">
+                <a:solidFill>
+                  <a:schemeClr val="accent5"/>
+                </a:solidFill>
+                <a:prstDash val="sysDot"/>
+              </a:ln>
+              <a:effectLst/>
+            </c:spPr>
+            <c:trendlineType val="poly"/>
+            <c:order val="4"/>
+            <c:dispRSqr val="0"/>
+            <c:dispEq val="0"/>
+          </c:trendline>
           <c:cat>
             <c:strRef>
               <c:f>Feuil1!$A$2:$A$6</c:f>
@@ -883,26 +1373,26 @@
                 <c:formatCode>0.00%</c:formatCode>
                 <c:ptCount val="5"/>
                 <c:pt idx="0">
-                  <c:v>-5</c:v>
+                  <c:v>-3.4443999999999999</c:v>
                 </c:pt>
                 <c:pt idx="1">
-                  <c:v>-6.5</c:v>
+                  <c:v>-4.5</c:v>
                 </c:pt>
                 <c:pt idx="2">
-                  <c:v>-2.6389</c:v>
+                  <c:v>-1.75</c:v>
                 </c:pt>
                 <c:pt idx="3">
-                  <c:v>0.40450000000000003</c:v>
+                  <c:v>0.41539999999999999</c:v>
                 </c:pt>
                 <c:pt idx="4">
-                  <c:v>0.43819999999999998</c:v>
+                  <c:v>0.43919999999999998</c:v>
                 </c:pt>
               </c:numCache>
             </c:numRef>
           </c:val>
           <c:extLst>
             <c:ext xmlns:c16="http://schemas.microsoft.com/office/drawing/2014/chart" uri="{C3380CC4-5D6E-409C-BE32-E72D297353CC}">
-              <c16:uniqueId val="{00000001-1553-4616-B518-3A46265C9329}"/>
+              <c16:uniqueId val="{00000002-8346-4B5F-B626-C3817D6A7C47}"/>
             </c:ext>
           </c:extLst>
         </c:ser>
@@ -1071,7 +1561,7 @@
                 </c:val>
                 <c:extLst>
                   <c:ext xmlns:c16="http://schemas.microsoft.com/office/drawing/2014/chart" uri="{C3380CC4-5D6E-409C-BE32-E72D297353CC}">
-                    <c16:uniqueId val="{00000002-1553-4616-B518-3A46265C9329}"/>
+                    <c16:uniqueId val="{00000003-8346-4B5F-B626-C3817D6A7C47}"/>
                   </c:ext>
                 </c:extLst>
               </c15:ser>
@@ -1224,9 +1714,9 @@
                     </c:numCache>
                   </c:numRef>
                 </c:val>
-                <c:extLst>
+                <c:extLst xmlns:c15="http://schemas.microsoft.com/office/drawing/2012/chart">
                   <c:ext xmlns:c16="http://schemas.microsoft.com/office/drawing/2014/chart" uri="{C3380CC4-5D6E-409C-BE32-E72D297353CC}">
-                    <c16:uniqueId val="{00000003-1553-4616-B518-3A46265C9329}"/>
+                    <c16:uniqueId val="{00000004-8346-4B5F-B626-C3817D6A7C47}"/>
                   </c:ext>
                 </c:extLst>
               </c15:ser>
@@ -1362,26 +1852,26 @@
                       <c:formatCode>General</c:formatCode>
                       <c:ptCount val="5"/>
                       <c:pt idx="0">
-                        <c:v>50</c:v>
+                        <c:v>36</c:v>
                       </c:pt>
                       <c:pt idx="1">
-                        <c:v>29</c:v>
+                        <c:v>21</c:v>
                       </c:pt>
                       <c:pt idx="2">
-                        <c:v>114</c:v>
+                        <c:v>82</c:v>
                       </c:pt>
                       <c:pt idx="3">
-                        <c:v>538</c:v>
+                        <c:v>406</c:v>
                       </c:pt>
                       <c:pt idx="4">
-                        <c:v>651</c:v>
+                        <c:v>507</c:v>
                       </c:pt>
                     </c:numCache>
                   </c:numRef>
                 </c:val>
-                <c:extLst>
+                <c:extLst xmlns:c15="http://schemas.microsoft.com/office/drawing/2012/chart">
                   <c:ext xmlns:c16="http://schemas.microsoft.com/office/drawing/2014/chart" uri="{C3380CC4-5D6E-409C-BE32-E72D297353CC}">
-                    <c16:uniqueId val="{00000004-1553-4616-B518-3A46265C9329}"/>
+                    <c16:uniqueId val="{00000005-8346-4B5F-B626-C3817D6A7C47}"/>
                   </c:ext>
                 </c:extLst>
               </c15:ser>
@@ -1537,471 +2027,6 @@
     </c:legend>
     <c:plotVisOnly val="1"/>
     <c:dispBlanksAs val="gap"/>
-    <c:showDLblsOverMax val="0"/>
-  </c:chart>
-  <c:spPr>
-    <a:noFill/>
-    <a:ln>
-      <a:noFill/>
-    </a:ln>
-    <a:effectLst/>
-  </c:spPr>
-  <c:txPr>
-    <a:bodyPr/>
-    <a:lstStyle/>
-    <a:p>
-      <a:pPr>
-        <a:defRPr/>
-      </a:pPr>
-      <a:endParaRPr lang="fr-FR"/>
-    </a:p>
-  </c:txPr>
-  <c:externalData r:id="rId3">
-    <c:autoUpdate val="0"/>
-  </c:externalData>
-</c:chartSpace>
-</file>
-
-<file path=ppt/charts/chart2.xml><?xml version="1.0" encoding="utf-8"?>
-<c:chartSpace xmlns:c="http://schemas.openxmlformats.org/drawingml/2006/chart" xmlns:a="http://schemas.openxmlformats.org/drawingml/2006/main" xmlns:r="http://schemas.openxmlformats.org/officeDocument/2006/relationships" xmlns:c16r2="http://schemas.microsoft.com/office/drawing/2015/06/chart">
-  <c:date1904 val="0"/>
-  <c:lang val="fr-FR"/>
-  <c:roundedCorners val="0"/>
-  <mc:AlternateContent xmlns:mc="http://schemas.openxmlformats.org/markup-compatibility/2006">
-    <mc:Choice xmlns:c14="http://schemas.microsoft.com/office/drawing/2007/8/2/chart" Requires="c14">
-      <c14:style val="102"/>
-    </mc:Choice>
-    <mc:Fallback>
-      <c:style val="2"/>
-    </mc:Fallback>
-  </mc:AlternateContent>
-  <c:chart>
-    <c:title>
-      <c:overlay val="0"/>
-      <c:spPr>
-        <a:noFill/>
-        <a:ln>
-          <a:noFill/>
-        </a:ln>
-        <a:effectLst/>
-      </c:spPr>
-      <c:txPr>
-        <a:bodyPr rot="0" spcFirstLastPara="1" vertOverflow="ellipsis" vert="horz" wrap="square" anchor="ctr" anchorCtr="1"/>
-        <a:lstStyle/>
-        <a:p>
-          <a:pPr>
-            <a:defRPr sz="1400" b="0" i="0" u="none" strike="noStrike" kern="1200" spc="0" baseline="0">
-              <a:solidFill>
-                <a:schemeClr val="tx1">
-                  <a:lumMod val="65000"/>
-                  <a:lumOff val="35000"/>
-                </a:schemeClr>
-              </a:solidFill>
-              <a:latin typeface="+mn-lt"/>
-              <a:ea typeface="+mn-ea"/>
-              <a:cs typeface="+mn-cs"/>
-            </a:defRPr>
-          </a:pPr>
-          <a:endParaRPr lang="fr-FR"/>
-        </a:p>
-      </c:txPr>
-    </c:title>
-    <c:autoTitleDeleted val="0"/>
-    <c:plotArea>
-      <c:layout/>
-      <c:pieChart>
-        <c:varyColors val="1"/>
-        <c:ser>
-          <c:idx val="0"/>
-          <c:order val="0"/>
-          <c:tx>
-            <c:strRef>
-              <c:f>Feuil1!$A$2</c:f>
-              <c:strCache>
-                <c:ptCount val="1"/>
-                <c:pt idx="0">
-                  <c:v>Bonjour</c:v>
-                </c:pt>
-              </c:strCache>
-            </c:strRef>
-          </c:tx>
-          <c:dPt>
-            <c:idx val="0"/>
-            <c:bubble3D val="0"/>
-            <c:spPr>
-              <a:solidFill>
-                <a:schemeClr val="accent1"/>
-              </a:solidFill>
-              <a:ln w="19050">
-                <a:solidFill>
-                  <a:schemeClr val="lt1"/>
-                </a:solidFill>
-              </a:ln>
-              <a:effectLst/>
-            </c:spPr>
-            <c:extLst>
-              <c:ext xmlns:c16="http://schemas.microsoft.com/office/drawing/2014/chart" uri="{C3380CC4-5D6E-409C-BE32-E72D297353CC}">
-                <c16:uniqueId val="{00000001-5C89-4930-8173-42A15B54DE2F}"/>
-              </c:ext>
-            </c:extLst>
-          </c:dPt>
-          <c:dPt>
-            <c:idx val="1"/>
-            <c:bubble3D val="0"/>
-            <c:spPr>
-              <a:solidFill>
-                <a:schemeClr val="accent2"/>
-              </a:solidFill>
-              <a:ln w="19050">
-                <a:solidFill>
-                  <a:schemeClr val="lt1"/>
-                </a:solidFill>
-              </a:ln>
-              <a:effectLst/>
-            </c:spPr>
-            <c:extLst>
-              <c:ext xmlns:c16="http://schemas.microsoft.com/office/drawing/2014/chart" uri="{C3380CC4-5D6E-409C-BE32-E72D297353CC}">
-                <c16:uniqueId val="{00000003-5C89-4930-8173-42A15B54DE2F}"/>
-              </c:ext>
-            </c:extLst>
-          </c:dPt>
-          <c:dPt>
-            <c:idx val="2"/>
-            <c:bubble3D val="0"/>
-            <c:spPr>
-              <a:solidFill>
-                <a:schemeClr val="accent3"/>
-              </a:solidFill>
-              <a:ln w="19050">
-                <a:solidFill>
-                  <a:schemeClr val="lt1"/>
-                </a:solidFill>
-              </a:ln>
-              <a:effectLst/>
-            </c:spPr>
-            <c:extLst>
-              <c:ext xmlns:c16="http://schemas.microsoft.com/office/drawing/2014/chart" uri="{C3380CC4-5D6E-409C-BE32-E72D297353CC}">
-                <c16:uniqueId val="{00000005-5C89-4930-8173-42A15B54DE2F}"/>
-              </c:ext>
-            </c:extLst>
-          </c:dPt>
-          <c:cat>
-            <c:strRef>
-              <c:f>Feuil1!$B$1:$D$1</c:f>
-              <c:strCache>
-                <c:ptCount val="3"/>
-                <c:pt idx="0">
-                  <c:v>Original</c:v>
-                </c:pt>
-                <c:pt idx="1">
-                  <c:v>Compressé</c:v>
-                </c:pt>
-                <c:pt idx="2">
-                  <c:v>Fréquences</c:v>
-                </c:pt>
-              </c:strCache>
-            </c:strRef>
-          </c:cat>
-          <c:val>
-            <c:numRef>
-              <c:f>Feuil1!$B$2:$D$2</c:f>
-              <c:numCache>
-                <c:formatCode>General</c:formatCode>
-                <c:ptCount val="3"/>
-                <c:pt idx="0">
-                  <c:v>9</c:v>
-                </c:pt>
-                <c:pt idx="1">
-                  <c:v>4</c:v>
-                </c:pt>
-                <c:pt idx="2">
-                  <c:v>50</c:v>
-                </c:pt>
-              </c:numCache>
-            </c:numRef>
-          </c:val>
-          <c:extLst>
-            <c:ext xmlns:c16="http://schemas.microsoft.com/office/drawing/2014/chart" uri="{C3380CC4-5D6E-409C-BE32-E72D297353CC}">
-              <c16:uniqueId val="{00000006-5C89-4930-8173-42A15B54DE2F}"/>
-            </c:ext>
-          </c:extLst>
-        </c:ser>
-        <c:dLbls>
-          <c:showLegendKey val="0"/>
-          <c:showVal val="0"/>
-          <c:showCatName val="0"/>
-          <c:showSerName val="0"/>
-          <c:showPercent val="0"/>
-          <c:showBubbleSize val="0"/>
-          <c:showLeaderLines val="1"/>
-        </c:dLbls>
-        <c:firstSliceAng val="0"/>
-      </c:pieChart>
-      <c:spPr>
-        <a:noFill/>
-        <a:ln>
-          <a:noFill/>
-        </a:ln>
-        <a:effectLst/>
-      </c:spPr>
-    </c:plotArea>
-    <c:plotVisOnly val="1"/>
-    <c:dispBlanksAs val="gap"/>
-    <c:extLst>
-      <c:ext xmlns:c16r3="http://schemas.microsoft.com/office/drawing/2017/03/chart" uri="{56B9EC1D-385E-4148-901F-78D8002777C0}">
-        <c16r3:dataDisplayOptions16>
-          <c16r3:dispNaAsBlank val="1"/>
-        </c16r3:dataDisplayOptions16>
-      </c:ext>
-    </c:extLst>
-    <c:showDLblsOverMax val="0"/>
-  </c:chart>
-  <c:spPr>
-    <a:noFill/>
-    <a:ln>
-      <a:noFill/>
-    </a:ln>
-    <a:effectLst/>
-  </c:spPr>
-  <c:txPr>
-    <a:bodyPr/>
-    <a:lstStyle/>
-    <a:p>
-      <a:pPr>
-        <a:defRPr/>
-      </a:pPr>
-      <a:endParaRPr lang="fr-FR"/>
-    </a:p>
-  </c:txPr>
-  <c:externalData r:id="rId3">
-    <c:autoUpdate val="0"/>
-  </c:externalData>
-</c:chartSpace>
-</file>
-
-<file path=ppt/charts/chart3.xml><?xml version="1.0" encoding="utf-8"?>
-<c:chartSpace xmlns:c="http://schemas.openxmlformats.org/drawingml/2006/chart" xmlns:a="http://schemas.openxmlformats.org/drawingml/2006/main" xmlns:r="http://schemas.openxmlformats.org/officeDocument/2006/relationships" xmlns:c16r2="http://schemas.microsoft.com/office/drawing/2015/06/chart">
-  <c:date1904 val="0"/>
-  <c:lang val="fr-FR"/>
-  <c:roundedCorners val="0"/>
-  <mc:AlternateContent xmlns:mc="http://schemas.openxmlformats.org/markup-compatibility/2006">
-    <mc:Choice xmlns:c14="http://schemas.microsoft.com/office/drawing/2007/8/2/chart" Requires="c14">
-      <c14:style val="102"/>
-    </mc:Choice>
-    <mc:Fallback>
-      <c:style val="2"/>
-    </mc:Fallback>
-  </mc:AlternateContent>
-  <c:chart>
-    <c:title>
-      <c:overlay val="0"/>
-      <c:spPr>
-        <a:noFill/>
-        <a:ln>
-          <a:noFill/>
-        </a:ln>
-        <a:effectLst/>
-      </c:spPr>
-      <c:txPr>
-        <a:bodyPr rot="0" spcFirstLastPara="1" vertOverflow="ellipsis" vert="horz" wrap="square" anchor="ctr" anchorCtr="1"/>
-        <a:lstStyle/>
-        <a:p>
-          <a:pPr>
-            <a:defRPr sz="1400" b="0" i="0" u="none" strike="noStrike" kern="1200" spc="0" baseline="0">
-              <a:solidFill>
-                <a:schemeClr val="tx1">
-                  <a:lumMod val="65000"/>
-                  <a:lumOff val="35000"/>
-                </a:schemeClr>
-              </a:solidFill>
-              <a:latin typeface="+mn-lt"/>
-              <a:ea typeface="+mn-ea"/>
-              <a:cs typeface="+mn-cs"/>
-            </a:defRPr>
-          </a:pPr>
-          <a:endParaRPr lang="fr-FR"/>
-        </a:p>
-      </c:txPr>
-    </c:title>
-    <c:autoTitleDeleted val="0"/>
-    <c:plotArea>
-      <c:layout/>
-      <c:pieChart>
-        <c:varyColors val="1"/>
-        <c:ser>
-          <c:idx val="0"/>
-          <c:order val="0"/>
-          <c:tx>
-            <c:strRef>
-              <c:f>Feuil1!$A$6</c:f>
-              <c:strCache>
-                <c:ptCount val="1"/>
-                <c:pt idx="0">
-                  <c:v>Alice</c:v>
-                </c:pt>
-              </c:strCache>
-            </c:strRef>
-          </c:tx>
-          <c:dPt>
-            <c:idx val="0"/>
-            <c:bubble3D val="0"/>
-            <c:spPr>
-              <a:solidFill>
-                <a:schemeClr val="accent1"/>
-              </a:solidFill>
-              <a:ln w="19050">
-                <a:solidFill>
-                  <a:schemeClr val="lt1"/>
-                </a:solidFill>
-              </a:ln>
-              <a:effectLst/>
-            </c:spPr>
-            <c:extLst>
-              <c:ext xmlns:c16="http://schemas.microsoft.com/office/drawing/2014/chart" uri="{C3380CC4-5D6E-409C-BE32-E72D297353CC}">
-                <c16:uniqueId val="{00000001-870B-4C1E-A8DF-6D74B8ECCA0E}"/>
-              </c:ext>
-            </c:extLst>
-          </c:dPt>
-          <c:dPt>
-            <c:idx val="1"/>
-            <c:bubble3D val="0"/>
-            <c:spPr>
-              <a:solidFill>
-                <a:schemeClr val="accent2"/>
-              </a:solidFill>
-              <a:ln w="19050">
-                <a:solidFill>
-                  <a:schemeClr val="lt1"/>
-                </a:solidFill>
-              </a:ln>
-              <a:effectLst/>
-            </c:spPr>
-            <c:extLst>
-              <c:ext xmlns:c16="http://schemas.microsoft.com/office/drawing/2014/chart" uri="{C3380CC4-5D6E-409C-BE32-E72D297353CC}">
-                <c16:uniqueId val="{00000003-870B-4C1E-A8DF-6D74B8ECCA0E}"/>
-              </c:ext>
-            </c:extLst>
-          </c:dPt>
-          <c:dPt>
-            <c:idx val="2"/>
-            <c:bubble3D val="0"/>
-            <c:spPr>
-              <a:solidFill>
-                <a:schemeClr val="accent3"/>
-              </a:solidFill>
-              <a:ln w="19050">
-                <a:solidFill>
-                  <a:schemeClr val="lt1"/>
-                </a:solidFill>
-              </a:ln>
-              <a:effectLst/>
-            </c:spPr>
-            <c:extLst>
-              <c:ext xmlns:c16="http://schemas.microsoft.com/office/drawing/2014/chart" uri="{C3380CC4-5D6E-409C-BE32-E72D297353CC}">
-                <c16:uniqueId val="{00000005-870B-4C1E-A8DF-6D74B8ECCA0E}"/>
-              </c:ext>
-            </c:extLst>
-          </c:dPt>
-          <c:cat>
-            <c:strRef>
-              <c:f>Feuil1!$B$1:$D$1</c:f>
-              <c:strCache>
-                <c:ptCount val="3"/>
-                <c:pt idx="0">
-                  <c:v>Original</c:v>
-                </c:pt>
-                <c:pt idx="1">
-                  <c:v>Compressé</c:v>
-                </c:pt>
-                <c:pt idx="2">
-                  <c:v>Fréquences</c:v>
-                </c:pt>
-              </c:strCache>
-            </c:strRef>
-          </c:cat>
-          <c:val>
-            <c:numRef>
-              <c:f>Feuil1!$B$6:$D$6</c:f>
-              <c:numCache>
-                <c:formatCode>General</c:formatCode>
-                <c:ptCount val="3"/>
-                <c:pt idx="0">
-                  <c:v>152089</c:v>
-                </c:pt>
-                <c:pt idx="1">
-                  <c:v>84787</c:v>
-                </c:pt>
-                <c:pt idx="2">
-                  <c:v>651</c:v>
-                </c:pt>
-              </c:numCache>
-            </c:numRef>
-          </c:val>
-          <c:extLst>
-            <c:ext xmlns:c16="http://schemas.microsoft.com/office/drawing/2014/chart" uri="{C3380CC4-5D6E-409C-BE32-E72D297353CC}">
-              <c16:uniqueId val="{00000006-870B-4C1E-A8DF-6D74B8ECCA0E}"/>
-            </c:ext>
-          </c:extLst>
-        </c:ser>
-        <c:dLbls>
-          <c:showLegendKey val="0"/>
-          <c:showVal val="0"/>
-          <c:showCatName val="0"/>
-          <c:showSerName val="0"/>
-          <c:showPercent val="0"/>
-          <c:showBubbleSize val="0"/>
-          <c:showLeaderLines val="1"/>
-        </c:dLbls>
-        <c:firstSliceAng val="0"/>
-      </c:pieChart>
-      <c:spPr>
-        <a:noFill/>
-        <a:ln>
-          <a:noFill/>
-        </a:ln>
-        <a:effectLst/>
-      </c:spPr>
-    </c:plotArea>
-    <c:legend>
-      <c:legendPos val="b"/>
-      <c:overlay val="0"/>
-      <c:spPr>
-        <a:noFill/>
-        <a:ln>
-          <a:noFill/>
-        </a:ln>
-        <a:effectLst/>
-      </c:spPr>
-      <c:txPr>
-        <a:bodyPr rot="0" spcFirstLastPara="1" vertOverflow="ellipsis" vert="horz" wrap="square" anchor="ctr" anchorCtr="1"/>
-        <a:lstStyle/>
-        <a:p>
-          <a:pPr rtl="0">
-            <a:defRPr sz="900" b="0" i="0" u="none" strike="noStrike" kern="1200" baseline="0">
-              <a:solidFill>
-                <a:schemeClr val="tx1">
-                  <a:lumMod val="65000"/>
-                  <a:lumOff val="35000"/>
-                </a:schemeClr>
-              </a:solidFill>
-              <a:latin typeface="+mn-lt"/>
-              <a:ea typeface="+mn-ea"/>
-              <a:cs typeface="+mn-cs"/>
-            </a:defRPr>
-          </a:pPr>
-          <a:endParaRPr lang="fr-FR"/>
-        </a:p>
-      </c:txPr>
-    </c:legend>
-    <c:plotVisOnly val="1"/>
-    <c:dispBlanksAs val="gap"/>
-    <c:extLst>
-      <c:ext xmlns:c16r3="http://schemas.microsoft.com/office/drawing/2017/03/chart" uri="{56B9EC1D-385E-4148-901F-78D8002777C0}">
-        <c16r3:dataDisplayOptions16>
-          <c16r3:dispNaAsBlank val="1"/>
-        </c16r3:dataDisplayOptions16>
-      </c:ext>
-    </c:extLst>
     <c:showDLblsOverMax val="0"/>
   </c:chart>
   <c:spPr>
@@ -2148,7 +2173,7 @@
 </file>
 
 <file path=ppt/charts/style1.xml><?xml version="1.0" encoding="utf-8"?>
-<cs:chartStyle xmlns:cs="http://schemas.microsoft.com/office/drawing/2012/chartStyle" xmlns:a="http://schemas.openxmlformats.org/drawingml/2006/main" id="201">
+<cs:chartStyle xmlns:cs="http://schemas.microsoft.com/office/drawing/2012/chartStyle" xmlns:a="http://schemas.openxmlformats.org/drawingml/2006/main" id="251">
   <cs:axisTitle>
     <cs:lnRef idx="0"/>
     <cs:fillRef idx="0"/>
@@ -2205,7 +2230,7 @@
         <a:round/>
       </a:ln>
     </cs:spPr>
-    <cs:defRPr sz="1000" kern="1200"/>
+    <cs:defRPr sz="900" kern="1200"/>
   </cs:chartArea>
   <cs:dataLabel>
     <cs:lnRef idx="0"/>
@@ -2256,6 +2281,13 @@
     <cs:fontRef idx="minor">
       <a:schemeClr val="tx1"/>
     </cs:fontRef>
+    <cs:spPr>
+      <a:ln w="19050">
+        <a:solidFill>
+          <a:schemeClr val="lt1"/>
+        </a:solidFill>
+      </a:ln>
+    </cs:spPr>
   </cs:dataPoint>
   <cs:dataPoint3D>
     <cs:lnRef idx="0"/>
@@ -2266,12 +2298,19 @@
     <cs:fontRef idx="minor">
       <a:schemeClr val="tx1"/>
     </cs:fontRef>
+    <cs:spPr>
+      <a:ln w="25400">
+        <a:solidFill>
+          <a:schemeClr val="lt1"/>
+        </a:solidFill>
+      </a:ln>
+    </cs:spPr>
   </cs:dataPoint3D>
   <cs:dataPointLine>
     <cs:lnRef idx="0">
       <cs:styleClr val="auto"/>
     </cs:lnRef>
-    <cs:fillRef idx="1"/>
+    <cs:fillRef idx="0"/>
     <cs:effectRef idx="0"/>
     <cs:fontRef idx="minor">
       <a:schemeClr val="tx1"/>
@@ -2309,7 +2348,7 @@
     <cs:lnRef idx="0">
       <cs:styleClr val="auto"/>
     </cs:lnRef>
-    <cs:fillRef idx="1"/>
+    <cs:fillRef idx="0"/>
     <cs:effectRef idx="0"/>
     <cs:fontRef idx="minor">
       <a:schemeClr val="tx1"/>
@@ -2352,22 +2391,23 @@
     <cs:fillRef idx="0"/>
     <cs:effectRef idx="0"/>
     <cs:fontRef idx="minor">
-      <a:schemeClr val="dk1"/>
+      <a:schemeClr val="tx1"/>
     </cs:fontRef>
     <cs:spPr>
       <a:solidFill>
         <a:schemeClr val="dk1">
-          <a:lumMod val="65000"/>
-          <a:lumOff val="35000"/>
+          <a:lumMod val="75000"/>
+          <a:lumOff val="25000"/>
         </a:schemeClr>
       </a:solidFill>
-      <a:ln w="9525">
+      <a:ln w="9525" cap="flat" cmpd="sng" algn="ctr">
         <a:solidFill>
           <a:schemeClr val="tx1">
             <a:lumMod val="65000"/>
             <a:lumOff val="35000"/>
           </a:schemeClr>
         </a:solidFill>
+        <a:round/>
       </a:ln>
     </cs:spPr>
   </cs:downBar>
@@ -2472,8 +2512,8 @@
       <a:ln w="9525" cap="flat" cmpd="sng" algn="ctr">
         <a:solidFill>
           <a:schemeClr val="tx1">
-            <a:lumMod val="75000"/>
-            <a:lumOff val="25000"/>
+            <a:lumMod val="50000"/>
+            <a:lumOff val="50000"/>
           </a:schemeClr>
         </a:solidFill>
         <a:round/>
@@ -2605,19 +2645,20 @@
     <cs:fillRef idx="0"/>
     <cs:effectRef idx="0"/>
     <cs:fontRef idx="minor">
-      <a:schemeClr val="dk1"/>
+      <a:schemeClr val="tx1"/>
     </cs:fontRef>
     <cs:spPr>
       <a:solidFill>
         <a:schemeClr val="lt1"/>
       </a:solidFill>
-      <a:ln w="9525">
+      <a:ln w="9525" cap="flat" cmpd="sng" algn="ctr">
         <a:solidFill>
           <a:schemeClr val="tx1">
-            <a:lumMod val="15000"/>
-            <a:lumOff val="85000"/>
+            <a:lumMod val="65000"/>
+            <a:lumOff val="35000"/>
           </a:schemeClr>
         </a:solidFill>
+        <a:round/>
       </a:ln>
     </cs:spPr>
   </cs:upBar>
@@ -3170,7 +3211,7 @@
 </file>
 
 <file path=ppt/charts/style3.xml><?xml version="1.0" encoding="utf-8"?>
-<cs:chartStyle xmlns:cs="http://schemas.microsoft.com/office/drawing/2012/chartStyle" xmlns:a="http://schemas.openxmlformats.org/drawingml/2006/main" id="251">
+<cs:chartStyle xmlns:cs="http://schemas.microsoft.com/office/drawing/2012/chartStyle" xmlns:a="http://schemas.openxmlformats.org/drawingml/2006/main" id="201">
   <cs:axisTitle>
     <cs:lnRef idx="0"/>
     <cs:fillRef idx="0"/>
@@ -3227,7 +3268,7 @@
         <a:round/>
       </a:ln>
     </cs:spPr>
-    <cs:defRPr sz="900" kern="1200"/>
+    <cs:defRPr sz="1000" kern="1200"/>
   </cs:chartArea>
   <cs:dataLabel>
     <cs:lnRef idx="0"/>
@@ -3278,13 +3319,6 @@
     <cs:fontRef idx="minor">
       <a:schemeClr val="tx1"/>
     </cs:fontRef>
-    <cs:spPr>
-      <a:ln w="19050">
-        <a:solidFill>
-          <a:schemeClr val="lt1"/>
-        </a:solidFill>
-      </a:ln>
-    </cs:spPr>
   </cs:dataPoint>
   <cs:dataPoint3D>
     <cs:lnRef idx="0"/>
@@ -3295,19 +3329,12 @@
     <cs:fontRef idx="minor">
       <a:schemeClr val="tx1"/>
     </cs:fontRef>
-    <cs:spPr>
-      <a:ln w="25400">
-        <a:solidFill>
-          <a:schemeClr val="lt1"/>
-        </a:solidFill>
-      </a:ln>
-    </cs:spPr>
   </cs:dataPoint3D>
   <cs:dataPointLine>
     <cs:lnRef idx="0">
       <cs:styleClr val="auto"/>
     </cs:lnRef>
-    <cs:fillRef idx="0"/>
+    <cs:fillRef idx="1"/>
     <cs:effectRef idx="0"/>
     <cs:fontRef idx="minor">
       <a:schemeClr val="tx1"/>
@@ -3345,7 +3372,7 @@
     <cs:lnRef idx="0">
       <cs:styleClr val="auto"/>
     </cs:lnRef>
-    <cs:fillRef idx="0"/>
+    <cs:fillRef idx="1"/>
     <cs:effectRef idx="0"/>
     <cs:fontRef idx="minor">
       <a:schemeClr val="tx1"/>
@@ -3388,23 +3415,22 @@
     <cs:fillRef idx="0"/>
     <cs:effectRef idx="0"/>
     <cs:fontRef idx="minor">
-      <a:schemeClr val="tx1"/>
+      <a:schemeClr val="dk1"/>
     </cs:fontRef>
     <cs:spPr>
       <a:solidFill>
         <a:schemeClr val="dk1">
-          <a:lumMod val="75000"/>
-          <a:lumOff val="25000"/>
+          <a:lumMod val="65000"/>
+          <a:lumOff val="35000"/>
         </a:schemeClr>
       </a:solidFill>
-      <a:ln w="9525" cap="flat" cmpd="sng" algn="ctr">
+      <a:ln w="9525">
         <a:solidFill>
           <a:schemeClr val="tx1">
             <a:lumMod val="65000"/>
             <a:lumOff val="35000"/>
           </a:schemeClr>
         </a:solidFill>
-        <a:round/>
       </a:ln>
     </cs:spPr>
   </cs:downBar>
@@ -3509,8 +3535,8 @@
       <a:ln w="9525" cap="flat" cmpd="sng" algn="ctr">
         <a:solidFill>
           <a:schemeClr val="tx1">
-            <a:lumMod val="50000"/>
-            <a:lumOff val="50000"/>
+            <a:lumMod val="75000"/>
+            <a:lumOff val="25000"/>
           </a:schemeClr>
         </a:solidFill>
         <a:round/>
@@ -3642,20 +3668,19 @@
     <cs:fillRef idx="0"/>
     <cs:effectRef idx="0"/>
     <cs:fontRef idx="minor">
-      <a:schemeClr val="tx1"/>
+      <a:schemeClr val="dk1"/>
     </cs:fontRef>
     <cs:spPr>
       <a:solidFill>
         <a:schemeClr val="lt1"/>
       </a:solidFill>
-      <a:ln w="9525" cap="flat" cmpd="sng" algn="ctr">
+      <a:ln w="9525">
         <a:solidFill>
           <a:schemeClr val="tx1">
-            <a:lumMod val="65000"/>
-            <a:lumOff val="35000"/>
+            <a:lumMod val="15000"/>
+            <a:lumOff val="85000"/>
           </a:schemeClr>
         </a:solidFill>
-        <a:round/>
       </a:ln>
     </cs:spPr>
   </cs:upBar>
@@ -3770,7 +3795,7 @@
           <a:p>
             <a:fld id="{9C4F6C12-D5EB-4AAF-A759-6FB0C35078C5}" type="datetimeFigureOut">
               <a:rPr lang="fr-FR" smtClean="0"/>
-              <a:t>23/03/2025</a:t>
+              <a:t>24/03/2025</a:t>
             </a:fld>
             <a:endParaRPr lang="fr-FR"/>
           </a:p>
@@ -4184,7 +4209,7 @@
           <a:p>
             <a:fld id="{AD964BF1-B679-4D07-B5CF-78BEEDC50E5A}" type="datetime1">
               <a:rPr lang="fr-FR" smtClean="0"/>
-              <a:t>23/03/2025</a:t>
+              <a:t>24/03/2025</a:t>
             </a:fld>
             <a:endParaRPr lang="fr-FR"/>
           </a:p>
@@ -4382,7 +4407,7 @@
           <a:p>
             <a:fld id="{D317FF6A-CA7A-48AE-B342-2BD3B64E9DA3}" type="datetime1">
               <a:rPr lang="fr-FR" smtClean="0"/>
-              <a:t>23/03/2025</a:t>
+              <a:t>24/03/2025</a:t>
             </a:fld>
             <a:endParaRPr lang="fr-FR"/>
           </a:p>
@@ -4590,7 +4615,7 @@
           <a:p>
             <a:fld id="{A66981FE-7730-42C7-B68B-7393CBD0F482}" type="datetime1">
               <a:rPr lang="fr-FR" smtClean="0"/>
-              <a:t>23/03/2025</a:t>
+              <a:t>24/03/2025</a:t>
             </a:fld>
             <a:endParaRPr lang="fr-FR"/>
           </a:p>
@@ -4788,7 +4813,7 @@
           <a:p>
             <a:fld id="{B8A6BD41-A8CA-4E43-A156-10904CB6565E}" type="datetime1">
               <a:rPr lang="fr-FR" smtClean="0"/>
-              <a:t>23/03/2025</a:t>
+              <a:t>24/03/2025</a:t>
             </a:fld>
             <a:endParaRPr lang="fr-FR"/>
           </a:p>
@@ -5063,7 +5088,7 @@
           <a:p>
             <a:fld id="{52E24426-6291-4BDC-90F6-0B1BBB01E86D}" type="datetime1">
               <a:rPr lang="fr-FR" smtClean="0"/>
-              <a:t>23/03/2025</a:t>
+              <a:t>24/03/2025</a:t>
             </a:fld>
             <a:endParaRPr lang="fr-FR"/>
           </a:p>
@@ -5328,7 +5353,7 @@
           <a:p>
             <a:fld id="{C6BA30BF-6A4F-43AD-9FB8-2B9ED2A8589D}" type="datetime1">
               <a:rPr lang="fr-FR" smtClean="0"/>
-              <a:t>23/03/2025</a:t>
+              <a:t>24/03/2025</a:t>
             </a:fld>
             <a:endParaRPr lang="fr-FR"/>
           </a:p>
@@ -5740,7 +5765,7 @@
           <a:p>
             <a:fld id="{C62799F2-03BE-4757-A80D-44FA9189C955}" type="datetime1">
               <a:rPr lang="fr-FR" smtClean="0"/>
-              <a:t>23/03/2025</a:t>
+              <a:t>24/03/2025</a:t>
             </a:fld>
             <a:endParaRPr lang="fr-FR"/>
           </a:p>
@@ -5881,7 +5906,7 @@
           <a:p>
             <a:fld id="{2F0EE53D-B11D-4EC9-89BD-5B033D82B35D}" type="datetime1">
               <a:rPr lang="fr-FR" smtClean="0"/>
-              <a:t>23/03/2025</a:t>
+              <a:t>24/03/2025</a:t>
             </a:fld>
             <a:endParaRPr lang="fr-FR"/>
           </a:p>
@@ -5994,7 +6019,7 @@
           <a:p>
             <a:fld id="{3FC70FBD-50CA-4017-B199-DE318CA71511}" type="datetime1">
               <a:rPr lang="fr-FR" smtClean="0"/>
-              <a:t>23/03/2025</a:t>
+              <a:t>24/03/2025</a:t>
             </a:fld>
             <a:endParaRPr lang="fr-FR"/>
           </a:p>
@@ -6305,7 +6330,7 @@
           <a:p>
             <a:fld id="{D5452138-6F00-4202-AC82-7C6E56CE0E37}" type="datetime1">
               <a:rPr lang="fr-FR" smtClean="0"/>
-              <a:t>23/03/2025</a:t>
+              <a:t>24/03/2025</a:t>
             </a:fld>
             <a:endParaRPr lang="fr-FR"/>
           </a:p>
@@ -6593,7 +6618,7 @@
           <a:p>
             <a:fld id="{41ACD80B-4F84-47C6-BE39-E6797B999135}" type="datetime1">
               <a:rPr lang="fr-FR" smtClean="0"/>
-              <a:t>23/03/2025</a:t>
+              <a:t>24/03/2025</a:t>
             </a:fld>
             <a:endParaRPr lang="fr-FR"/>
           </a:p>
@@ -6834,7 +6859,7 @@
           <a:p>
             <a:fld id="{3D14F8EF-FA1C-46F1-AD1A-D72D488ACDE1}" type="datetime1">
               <a:rPr lang="fr-FR" smtClean="0"/>
-              <a:t>23/03/2025</a:t>
+              <a:t>24/03/2025</a:t>
             </a:fld>
             <a:endParaRPr lang="fr-FR"/>
           </a:p>
@@ -13487,7 +13512,7 @@
           <p:nvPr>
             <p:extLst>
               <p:ext uri="{D42A27DB-BD31-4B8C-83A1-F6EECF244321}">
-                <p14:modId xmlns:p14="http://schemas.microsoft.com/office/powerpoint/2010/main" val="136437361"/>
+                <p14:modId xmlns:p14="http://schemas.microsoft.com/office/powerpoint/2010/main" val="2073688518"/>
               </p:ext>
             </p:extLst>
           </p:nvPr>
@@ -13792,18 +13817,15 @@
                     <a:p>
                       <a:pPr algn="r" fontAlgn="b"/>
                       <a:r>
-                        <a:rPr lang="fr-FR" sz="1100" u="none" strike="noStrike">
+                        <a:rPr lang="fr-FR" sz="1100" b="0" i="0" u="none" strike="noStrike">
+                          <a:solidFill>
+                            <a:srgbClr val="000000"/>
+                          </a:solidFill>
                           <a:effectLst/>
+                          <a:latin typeface="Aptos Narrow" panose="020B0004020202020204" pitchFamily="34" charset="0"/>
                         </a:rPr>
                         <a:t>9</a:t>
                       </a:r>
-                      <a:endParaRPr lang="fr-FR" sz="1100" b="0" i="0" u="none" strike="noStrike">
-                        <a:solidFill>
-                          <a:srgbClr val="000000"/>
-                        </a:solidFill>
-                        <a:effectLst/>
-                        <a:latin typeface="Aptos Narrow" panose="020B0004020202020204" pitchFamily="34" charset="0"/>
-                      </a:endParaRPr>
                     </a:p>
                   </a:txBody>
                   <a:tcPr marL="7620" marR="7620" marT="7620" marB="0" anchor="b">
@@ -13825,18 +13847,15 @@
                     <a:p>
                       <a:pPr algn="r" fontAlgn="b"/>
                       <a:r>
-                        <a:rPr lang="fr-FR" sz="1100" u="none" strike="noStrike">
+                        <a:rPr lang="fr-FR" sz="1100" b="0" i="0" u="none" strike="noStrike">
+                          <a:solidFill>
+                            <a:srgbClr val="000000"/>
+                          </a:solidFill>
                           <a:effectLst/>
+                          <a:latin typeface="Aptos Narrow" panose="020B0004020202020204" pitchFamily="34" charset="0"/>
                         </a:rPr>
                         <a:t>4</a:t>
                       </a:r>
-                      <a:endParaRPr lang="fr-FR" sz="1100" b="0" i="0" u="none" strike="noStrike">
-                        <a:solidFill>
-                          <a:srgbClr val="000000"/>
-                        </a:solidFill>
-                        <a:effectLst/>
-                        <a:latin typeface="Aptos Narrow" panose="020B0004020202020204" pitchFamily="34" charset="0"/>
-                      </a:endParaRPr>
                     </a:p>
                   </a:txBody>
                   <a:tcPr marL="7620" marR="7620" marT="7620" marB="0" anchor="b">
@@ -13858,18 +13877,15 @@
                     <a:p>
                       <a:pPr algn="r" fontAlgn="b"/>
                       <a:r>
-                        <a:rPr lang="fr-FR" sz="1100" u="none" strike="noStrike">
+                        <a:rPr lang="fr-FR" sz="1100" b="0" i="0" u="none" strike="noStrike">
+                          <a:solidFill>
+                            <a:srgbClr val="000000"/>
+                          </a:solidFill>
                           <a:effectLst/>
+                          <a:latin typeface="Aptos Narrow" panose="020B0004020202020204" pitchFamily="34" charset="0"/>
                         </a:rPr>
-                        <a:t>50</a:t>
+                        <a:t>36</a:t>
                       </a:r>
-                      <a:endParaRPr lang="fr-FR" sz="1100" b="0" i="0" u="none" strike="noStrike">
-                        <a:solidFill>
-                          <a:srgbClr val="000000"/>
-                        </a:solidFill>
-                        <a:effectLst/>
-                        <a:latin typeface="Aptos Narrow" panose="020B0004020202020204" pitchFamily="34" charset="0"/>
-                      </a:endParaRPr>
                     </a:p>
                   </a:txBody>
                   <a:tcPr marL="7620" marR="7620" marT="7620" marB="0" anchor="b">
@@ -13891,18 +13907,15 @@
                     <a:p>
                       <a:pPr algn="r" fontAlgn="b"/>
                       <a:r>
-                        <a:rPr lang="fr-FR" sz="1100" u="none" strike="noStrike">
+                        <a:rPr lang="fr-FR" sz="1100" b="0" i="0" u="none" strike="noStrike">
+                          <a:solidFill>
+                            <a:srgbClr val="000000"/>
+                          </a:solidFill>
                           <a:effectLst/>
+                          <a:latin typeface="Aptos Narrow" panose="020B0004020202020204" pitchFamily="34" charset="0"/>
                         </a:rPr>
                         <a:t>55,56%</a:t>
                       </a:r>
-                      <a:endParaRPr lang="fr-FR" sz="1100" b="0" i="0" u="none" strike="noStrike">
-                        <a:solidFill>
-                          <a:srgbClr val="000000"/>
-                        </a:solidFill>
-                        <a:effectLst/>
-                        <a:latin typeface="Aptos Narrow" panose="020B0004020202020204" pitchFamily="34" charset="0"/>
-                      </a:endParaRPr>
                     </a:p>
                   </a:txBody>
                   <a:tcPr marL="7620" marR="7620" marT="7620" marB="0" anchor="b">
@@ -13924,18 +13937,15 @@
                     <a:p>
                       <a:pPr algn="r" fontAlgn="b"/>
                       <a:r>
-                        <a:rPr lang="fr-FR" sz="1100" u="none" strike="noStrike">
+                        <a:rPr lang="fr-FR" sz="1100" b="0" i="0" u="none" strike="noStrike">
+                          <a:solidFill>
+                            <a:srgbClr val="000000"/>
+                          </a:solidFill>
                           <a:effectLst/>
+                          <a:latin typeface="Aptos Narrow" panose="020B0004020202020204" pitchFamily="34" charset="0"/>
                         </a:rPr>
-                        <a:t>-500,00%</a:t>
+                        <a:t>-344,44%</a:t>
                       </a:r>
-                      <a:endParaRPr lang="fr-FR" sz="1100" b="0" i="0" u="none" strike="noStrike">
-                        <a:solidFill>
-                          <a:srgbClr val="000000"/>
-                        </a:solidFill>
-                        <a:effectLst/>
-                        <a:latin typeface="Aptos Narrow" panose="020B0004020202020204" pitchFamily="34" charset="0"/>
-                      </a:endParaRPr>
                     </a:p>
                   </a:txBody>
                   <a:tcPr marL="7620" marR="7620" marT="7620" marB="0" anchor="b">
@@ -13987,18 +13997,15 @@
                     <a:p>
                       <a:pPr algn="r" fontAlgn="b"/>
                       <a:r>
-                        <a:rPr lang="fr-FR" sz="1100" u="none" strike="noStrike">
+                        <a:rPr lang="fr-FR" sz="1100" b="0" i="0" u="none" strike="noStrike">
+                          <a:solidFill>
+                            <a:srgbClr val="000000"/>
+                          </a:solidFill>
                           <a:effectLst/>
+                          <a:latin typeface="Aptos Narrow" panose="020B0004020202020204" pitchFamily="34" charset="0"/>
                         </a:rPr>
                         <a:t>4</a:t>
                       </a:r>
-                      <a:endParaRPr lang="fr-FR" sz="1100" b="0" i="0" u="none" strike="noStrike">
-                        <a:solidFill>
-                          <a:srgbClr val="000000"/>
-                        </a:solidFill>
-                        <a:effectLst/>
-                        <a:latin typeface="Aptos Narrow" panose="020B0004020202020204" pitchFamily="34" charset="0"/>
-                      </a:endParaRPr>
                     </a:p>
                   </a:txBody>
                   <a:tcPr marL="7620" marR="7620" marT="7620" marB="0" anchor="b"/>
@@ -14010,18 +14017,15 @@
                     <a:p>
                       <a:pPr algn="r" fontAlgn="b"/>
                       <a:r>
-                        <a:rPr lang="fr-FR" sz="1100" u="none" strike="noStrike">
+                        <a:rPr lang="fr-FR" sz="1100" b="0" i="0" u="none" strike="noStrike">
+                          <a:solidFill>
+                            <a:srgbClr val="000000"/>
+                          </a:solidFill>
                           <a:effectLst/>
+                          <a:latin typeface="Aptos Narrow" panose="020B0004020202020204" pitchFamily="34" charset="0"/>
                         </a:rPr>
                         <a:t>1</a:t>
                       </a:r>
-                      <a:endParaRPr lang="fr-FR" sz="1100" b="0" i="0" u="none" strike="noStrike">
-                        <a:solidFill>
-                          <a:srgbClr val="000000"/>
-                        </a:solidFill>
-                        <a:effectLst/>
-                        <a:latin typeface="Aptos Narrow" panose="020B0004020202020204" pitchFamily="34" charset="0"/>
-                      </a:endParaRPr>
                     </a:p>
                   </a:txBody>
                   <a:tcPr marL="7620" marR="7620" marT="7620" marB="0" anchor="b"/>
@@ -14033,18 +14037,15 @@
                     <a:p>
                       <a:pPr algn="r" fontAlgn="b"/>
                       <a:r>
-                        <a:rPr lang="fr-FR" sz="1100" u="none" strike="noStrike">
+                        <a:rPr lang="fr-FR" sz="1100" b="0" i="0" u="none" strike="noStrike">
+                          <a:solidFill>
+                            <a:srgbClr val="000000"/>
+                          </a:solidFill>
                           <a:effectLst/>
+                          <a:latin typeface="Aptos Narrow" panose="020B0004020202020204" pitchFamily="34" charset="0"/>
                         </a:rPr>
-                        <a:t>29</a:t>
+                        <a:t>21</a:t>
                       </a:r>
-                      <a:endParaRPr lang="fr-FR" sz="1100" b="0" i="0" u="none" strike="noStrike">
-                        <a:solidFill>
-                          <a:srgbClr val="000000"/>
-                        </a:solidFill>
-                        <a:effectLst/>
-                        <a:latin typeface="Aptos Narrow" panose="020B0004020202020204" pitchFamily="34" charset="0"/>
-                      </a:endParaRPr>
                     </a:p>
                   </a:txBody>
                   <a:tcPr marL="7620" marR="7620" marT="7620" marB="0" anchor="b"/>
@@ -14056,18 +14057,15 @@
                     <a:p>
                       <a:pPr algn="r" fontAlgn="b"/>
                       <a:r>
-                        <a:rPr lang="fr-FR" sz="1100" u="none" strike="noStrike">
+                        <a:rPr lang="fr-FR" sz="1100" b="0" i="0" u="none" strike="noStrike">
+                          <a:solidFill>
+                            <a:srgbClr val="000000"/>
+                          </a:solidFill>
                           <a:effectLst/>
+                          <a:latin typeface="Aptos Narrow" panose="020B0004020202020204" pitchFamily="34" charset="0"/>
                         </a:rPr>
                         <a:t>75,00%</a:t>
                       </a:r>
-                      <a:endParaRPr lang="fr-FR" sz="1100" b="0" i="0" u="none" strike="noStrike">
-                        <a:solidFill>
-                          <a:srgbClr val="000000"/>
-                        </a:solidFill>
-                        <a:effectLst/>
-                        <a:latin typeface="Aptos Narrow" panose="020B0004020202020204" pitchFamily="34" charset="0"/>
-                      </a:endParaRPr>
                     </a:p>
                   </a:txBody>
                   <a:tcPr marL="7620" marR="7620" marT="7620" marB="0" anchor="b"/>
@@ -14079,18 +14077,15 @@
                     <a:p>
                       <a:pPr algn="r" fontAlgn="b"/>
                       <a:r>
-                        <a:rPr lang="fr-FR" sz="1100" u="none" strike="noStrike" dirty="0">
+                        <a:rPr lang="fr-FR" sz="1100" b="0" i="0" u="none" strike="noStrike">
+                          <a:solidFill>
+                            <a:srgbClr val="000000"/>
+                          </a:solidFill>
                           <a:effectLst/>
+                          <a:latin typeface="Aptos Narrow" panose="020B0004020202020204" pitchFamily="34" charset="0"/>
                         </a:rPr>
-                        <a:t>-650,00%</a:t>
+                        <a:t>-450,00%</a:t>
                       </a:r>
-                      <a:endParaRPr lang="fr-FR" sz="1100" b="0" i="0" u="none" strike="noStrike" dirty="0">
-                        <a:solidFill>
-                          <a:srgbClr val="000000"/>
-                        </a:solidFill>
-                        <a:effectLst/>
-                        <a:latin typeface="Aptos Narrow" panose="020B0004020202020204" pitchFamily="34" charset="0"/>
-                      </a:endParaRPr>
                     </a:p>
                   </a:txBody>
                   <a:tcPr marL="7620" marR="7620" marT="7620" marB="0" anchor="b"/>
@@ -14132,18 +14127,15 @@
                     <a:p>
                       <a:pPr algn="r" fontAlgn="b"/>
                       <a:r>
-                        <a:rPr lang="fr-FR" sz="1100" u="none" strike="noStrike">
+                        <a:rPr lang="fr-FR" sz="1100" b="0" i="0" u="none" strike="noStrike">
+                          <a:solidFill>
+                            <a:srgbClr val="000000"/>
+                          </a:solidFill>
                           <a:effectLst/>
+                          <a:latin typeface="Aptos Narrow" panose="020B0004020202020204" pitchFamily="34" charset="0"/>
                         </a:rPr>
                         <a:t>36</a:t>
                       </a:r>
-                      <a:endParaRPr lang="fr-FR" sz="1100" b="0" i="0" u="none" strike="noStrike">
-                        <a:solidFill>
-                          <a:srgbClr val="000000"/>
-                        </a:solidFill>
-                        <a:effectLst/>
-                        <a:latin typeface="Aptos Narrow" panose="020B0004020202020204" pitchFamily="34" charset="0"/>
-                      </a:endParaRPr>
                     </a:p>
                   </a:txBody>
                   <a:tcPr marL="7620" marR="7620" marT="7620" marB="0" anchor="b"/>
@@ -14155,18 +14147,15 @@
                     <a:p>
                       <a:pPr algn="r" fontAlgn="b"/>
                       <a:r>
-                        <a:rPr lang="fr-FR" sz="1100" u="none" strike="noStrike">
+                        <a:rPr lang="fr-FR" sz="1100" b="0" i="0" u="none" strike="noStrike">
+                          <a:solidFill>
+                            <a:srgbClr val="000000"/>
+                          </a:solidFill>
                           <a:effectLst/>
+                          <a:latin typeface="Aptos Narrow" panose="020B0004020202020204" pitchFamily="34" charset="0"/>
                         </a:rPr>
                         <a:t>17</a:t>
                       </a:r>
-                      <a:endParaRPr lang="fr-FR" sz="1100" b="0" i="0" u="none" strike="noStrike">
-                        <a:solidFill>
-                          <a:srgbClr val="000000"/>
-                        </a:solidFill>
-                        <a:effectLst/>
-                        <a:latin typeface="Aptos Narrow" panose="020B0004020202020204" pitchFamily="34" charset="0"/>
-                      </a:endParaRPr>
                     </a:p>
                   </a:txBody>
                   <a:tcPr marL="7620" marR="7620" marT="7620" marB="0" anchor="b"/>
@@ -14178,18 +14167,15 @@
                     <a:p>
                       <a:pPr algn="r" fontAlgn="b"/>
                       <a:r>
-                        <a:rPr lang="fr-FR" sz="1100" u="none" strike="noStrike">
+                        <a:rPr lang="fr-FR" sz="1100" b="0" i="0" u="none" strike="noStrike">
+                          <a:solidFill>
+                            <a:srgbClr val="000000"/>
+                          </a:solidFill>
                           <a:effectLst/>
+                          <a:latin typeface="Aptos Narrow" panose="020B0004020202020204" pitchFamily="34" charset="0"/>
                         </a:rPr>
-                        <a:t>114</a:t>
+                        <a:t>82</a:t>
                       </a:r>
-                      <a:endParaRPr lang="fr-FR" sz="1100" b="0" i="0" u="none" strike="noStrike">
-                        <a:solidFill>
-                          <a:srgbClr val="000000"/>
-                        </a:solidFill>
-                        <a:effectLst/>
-                        <a:latin typeface="Aptos Narrow" panose="020B0004020202020204" pitchFamily="34" charset="0"/>
-                      </a:endParaRPr>
                     </a:p>
                   </a:txBody>
                   <a:tcPr marL="7620" marR="7620" marT="7620" marB="0" anchor="b"/>
@@ -14201,18 +14187,15 @@
                     <a:p>
                       <a:pPr algn="r" fontAlgn="b"/>
                       <a:r>
-                        <a:rPr lang="fr-FR" sz="1100" u="none" strike="noStrike">
+                        <a:rPr lang="fr-FR" sz="1100" b="0" i="0" u="none" strike="noStrike">
+                          <a:solidFill>
+                            <a:srgbClr val="000000"/>
+                          </a:solidFill>
                           <a:effectLst/>
+                          <a:latin typeface="Aptos Narrow" panose="020B0004020202020204" pitchFamily="34" charset="0"/>
                         </a:rPr>
                         <a:t>52,78%</a:t>
                       </a:r>
-                      <a:endParaRPr lang="fr-FR" sz="1100" b="0" i="0" u="none" strike="noStrike">
-                        <a:solidFill>
-                          <a:srgbClr val="000000"/>
-                        </a:solidFill>
-                        <a:effectLst/>
-                        <a:latin typeface="Aptos Narrow" panose="020B0004020202020204" pitchFamily="34" charset="0"/>
-                      </a:endParaRPr>
                     </a:p>
                   </a:txBody>
                   <a:tcPr marL="7620" marR="7620" marT="7620" marB="0" anchor="b"/>
@@ -14224,18 +14207,15 @@
                     <a:p>
                       <a:pPr algn="r" fontAlgn="b"/>
                       <a:r>
-                        <a:rPr lang="fr-FR" sz="1100" u="none" strike="noStrike">
+                        <a:rPr lang="fr-FR" sz="1100" b="0" i="0" u="none" strike="noStrike">
+                          <a:solidFill>
+                            <a:srgbClr val="000000"/>
+                          </a:solidFill>
                           <a:effectLst/>
+                          <a:latin typeface="Aptos Narrow" panose="020B0004020202020204" pitchFamily="34" charset="0"/>
                         </a:rPr>
-                        <a:t>-263,89%</a:t>
+                        <a:t>-175,00%</a:t>
                       </a:r>
-                      <a:endParaRPr lang="fr-FR" sz="1100" b="0" i="0" u="none" strike="noStrike">
-                        <a:solidFill>
-                          <a:srgbClr val="000000"/>
-                        </a:solidFill>
-                        <a:effectLst/>
-                        <a:latin typeface="Aptos Narrow" panose="020B0004020202020204" pitchFamily="34" charset="0"/>
-                      </a:endParaRPr>
                     </a:p>
                   </a:txBody>
                   <a:tcPr marL="7620" marR="7620" marT="7620" marB="0" anchor="b"/>
@@ -14277,18 +14257,15 @@
                     <a:p>
                       <a:pPr algn="r" fontAlgn="b"/>
                       <a:r>
-                        <a:rPr lang="fr-FR" sz="1100" u="none" strike="noStrike">
+                        <a:rPr lang="fr-FR" sz="1100" b="0" i="0" u="none" strike="noStrike">
+                          <a:solidFill>
+                            <a:srgbClr val="000000"/>
+                          </a:solidFill>
                           <a:effectLst/>
+                          <a:latin typeface="Aptos Narrow" panose="020B0004020202020204" pitchFamily="34" charset="0"/>
                         </a:rPr>
                         <a:t>12128</a:t>
                       </a:r>
-                      <a:endParaRPr lang="fr-FR" sz="1100" b="0" i="0" u="none" strike="noStrike">
-                        <a:solidFill>
-                          <a:srgbClr val="000000"/>
-                        </a:solidFill>
-                        <a:effectLst/>
-                        <a:latin typeface="Aptos Narrow" panose="020B0004020202020204" pitchFamily="34" charset="0"/>
-                      </a:endParaRPr>
                     </a:p>
                   </a:txBody>
                   <a:tcPr marL="7620" marR="7620" marT="7620" marB="0" anchor="b"/>
@@ -14300,18 +14277,15 @@
                     <a:p>
                       <a:pPr algn="r" fontAlgn="b"/>
                       <a:r>
-                        <a:rPr lang="fr-FR" sz="1100" u="none" strike="noStrike">
+                        <a:rPr lang="fr-FR" sz="1100" b="0" i="0" u="none" strike="noStrike">
+                          <a:solidFill>
+                            <a:srgbClr val="000000"/>
+                          </a:solidFill>
                           <a:effectLst/>
+                          <a:latin typeface="Aptos Narrow" panose="020B0004020202020204" pitchFamily="34" charset="0"/>
                         </a:rPr>
                         <a:t>6684</a:t>
                       </a:r>
-                      <a:endParaRPr lang="fr-FR" sz="1100" b="0" i="0" u="none" strike="noStrike">
-                        <a:solidFill>
-                          <a:srgbClr val="000000"/>
-                        </a:solidFill>
-                        <a:effectLst/>
-                        <a:latin typeface="Aptos Narrow" panose="020B0004020202020204" pitchFamily="34" charset="0"/>
-                      </a:endParaRPr>
                     </a:p>
                   </a:txBody>
                   <a:tcPr marL="7620" marR="7620" marT="7620" marB="0" anchor="b"/>
@@ -14323,18 +14297,15 @@
                     <a:p>
                       <a:pPr algn="r" fontAlgn="b"/>
                       <a:r>
-                        <a:rPr lang="fr-FR" sz="1100" u="none" strike="noStrike">
+                        <a:rPr lang="fr-FR" sz="1100" b="0" i="0" u="none" strike="noStrike">
+                          <a:solidFill>
+                            <a:srgbClr val="000000"/>
+                          </a:solidFill>
                           <a:effectLst/>
+                          <a:latin typeface="Aptos Narrow" panose="020B0004020202020204" pitchFamily="34" charset="0"/>
                         </a:rPr>
-                        <a:t>538</a:t>
+                        <a:t>406</a:t>
                       </a:r>
-                      <a:endParaRPr lang="fr-FR" sz="1100" b="0" i="0" u="none" strike="noStrike">
-                        <a:solidFill>
-                          <a:srgbClr val="000000"/>
-                        </a:solidFill>
-                        <a:effectLst/>
-                        <a:latin typeface="Aptos Narrow" panose="020B0004020202020204" pitchFamily="34" charset="0"/>
-                      </a:endParaRPr>
                     </a:p>
                   </a:txBody>
                   <a:tcPr marL="7620" marR="7620" marT="7620" marB="0" anchor="b"/>
@@ -14346,18 +14317,15 @@
                     <a:p>
                       <a:pPr algn="r" fontAlgn="b"/>
                       <a:r>
-                        <a:rPr lang="fr-FR" sz="1100" u="none" strike="noStrike">
+                        <a:rPr lang="fr-FR" sz="1100" b="0" i="0" u="none" strike="noStrike">
+                          <a:solidFill>
+                            <a:srgbClr val="000000"/>
+                          </a:solidFill>
                           <a:effectLst/>
+                          <a:latin typeface="Aptos Narrow" panose="020B0004020202020204" pitchFamily="34" charset="0"/>
                         </a:rPr>
                         <a:t>44,89%</a:t>
                       </a:r>
-                      <a:endParaRPr lang="fr-FR" sz="1100" b="0" i="0" u="none" strike="noStrike">
-                        <a:solidFill>
-                          <a:srgbClr val="000000"/>
-                        </a:solidFill>
-                        <a:effectLst/>
-                        <a:latin typeface="Aptos Narrow" panose="020B0004020202020204" pitchFamily="34" charset="0"/>
-                      </a:endParaRPr>
                     </a:p>
                   </a:txBody>
                   <a:tcPr marL="7620" marR="7620" marT="7620" marB="0" anchor="b"/>
@@ -14369,18 +14337,15 @@
                     <a:p>
                       <a:pPr algn="r" fontAlgn="b"/>
                       <a:r>
-                        <a:rPr lang="fr-FR" sz="1100" u="none" strike="noStrike">
+                        <a:rPr lang="fr-FR" sz="1100" b="0" i="0" u="none" strike="noStrike">
+                          <a:solidFill>
+                            <a:srgbClr val="000000"/>
+                          </a:solidFill>
                           <a:effectLst/>
+                          <a:latin typeface="Aptos Narrow" panose="020B0004020202020204" pitchFamily="34" charset="0"/>
                         </a:rPr>
-                        <a:t>40,45%</a:t>
+                        <a:t>41,54%</a:t>
                       </a:r>
-                      <a:endParaRPr lang="fr-FR" sz="1100" b="0" i="0" u="none" strike="noStrike">
-                        <a:solidFill>
-                          <a:srgbClr val="000000"/>
-                        </a:solidFill>
-                        <a:effectLst/>
-                        <a:latin typeface="Aptos Narrow" panose="020B0004020202020204" pitchFamily="34" charset="0"/>
-                      </a:endParaRPr>
                     </a:p>
                   </a:txBody>
                   <a:tcPr marL="7620" marR="7620" marT="7620" marB="0" anchor="b"/>
@@ -14422,18 +14387,15 @@
                     <a:p>
                       <a:pPr algn="r" fontAlgn="b"/>
                       <a:r>
-                        <a:rPr lang="fr-FR" sz="1100" u="none" strike="noStrike">
+                        <a:rPr lang="fr-FR" sz="1100" b="0" i="0" u="none" strike="noStrike">
+                          <a:solidFill>
+                            <a:srgbClr val="000000"/>
+                          </a:solidFill>
                           <a:effectLst/>
+                          <a:latin typeface="Aptos Narrow" panose="020B0004020202020204" pitchFamily="34" charset="0"/>
                         </a:rPr>
                         <a:t>152089</a:t>
                       </a:r>
-                      <a:endParaRPr lang="fr-FR" sz="1100" b="0" i="0" u="none" strike="noStrike">
-                        <a:solidFill>
-                          <a:srgbClr val="000000"/>
-                        </a:solidFill>
-                        <a:effectLst/>
-                        <a:latin typeface="Aptos Narrow" panose="020B0004020202020204" pitchFamily="34" charset="0"/>
-                      </a:endParaRPr>
                     </a:p>
                   </a:txBody>
                   <a:tcPr marL="7620" marR="7620" marT="7620" marB="0" anchor="b"/>
@@ -14445,18 +14407,15 @@
                     <a:p>
                       <a:pPr algn="r" fontAlgn="b"/>
                       <a:r>
-                        <a:rPr lang="fr-FR" sz="1100" u="none" strike="noStrike">
+                        <a:rPr lang="fr-FR" sz="1100" b="0" i="0" u="none" strike="noStrike">
+                          <a:solidFill>
+                            <a:srgbClr val="000000"/>
+                          </a:solidFill>
                           <a:effectLst/>
+                          <a:latin typeface="Aptos Narrow" panose="020B0004020202020204" pitchFamily="34" charset="0"/>
                         </a:rPr>
                         <a:t>84787</a:t>
                       </a:r>
-                      <a:endParaRPr lang="fr-FR" sz="1100" b="0" i="0" u="none" strike="noStrike">
-                        <a:solidFill>
-                          <a:srgbClr val="000000"/>
-                        </a:solidFill>
-                        <a:effectLst/>
-                        <a:latin typeface="Aptos Narrow" panose="020B0004020202020204" pitchFamily="34" charset="0"/>
-                      </a:endParaRPr>
                     </a:p>
                   </a:txBody>
                   <a:tcPr marL="7620" marR="7620" marT="7620" marB="0" anchor="b"/>
@@ -14468,18 +14427,15 @@
                     <a:p>
                       <a:pPr algn="r" fontAlgn="b"/>
                       <a:r>
-                        <a:rPr lang="fr-FR" sz="1100" u="none" strike="noStrike">
+                        <a:rPr lang="fr-FR" sz="1100" b="0" i="0" u="none" strike="noStrike">
+                          <a:solidFill>
+                            <a:srgbClr val="000000"/>
+                          </a:solidFill>
                           <a:effectLst/>
+                          <a:latin typeface="Aptos Narrow" panose="020B0004020202020204" pitchFamily="34" charset="0"/>
                         </a:rPr>
-                        <a:t>651</a:t>
+                        <a:t>507</a:t>
                       </a:r>
-                      <a:endParaRPr lang="fr-FR" sz="1100" b="0" i="0" u="none" strike="noStrike">
-                        <a:solidFill>
-                          <a:srgbClr val="000000"/>
-                        </a:solidFill>
-                        <a:effectLst/>
-                        <a:latin typeface="Aptos Narrow" panose="020B0004020202020204" pitchFamily="34" charset="0"/>
-                      </a:endParaRPr>
                     </a:p>
                   </a:txBody>
                   <a:tcPr marL="7620" marR="7620" marT="7620" marB="0" anchor="b"/>
@@ -14491,18 +14447,15 @@
                     <a:p>
                       <a:pPr algn="r" fontAlgn="b"/>
                       <a:r>
-                        <a:rPr lang="fr-FR" sz="1100" u="none" strike="noStrike">
+                        <a:rPr lang="fr-FR" sz="1100" b="0" i="0" u="none" strike="noStrike">
+                          <a:solidFill>
+                            <a:srgbClr val="000000"/>
+                          </a:solidFill>
                           <a:effectLst/>
+                          <a:latin typeface="Aptos Narrow" panose="020B0004020202020204" pitchFamily="34" charset="0"/>
                         </a:rPr>
                         <a:t>44,25%</a:t>
                       </a:r>
-                      <a:endParaRPr lang="fr-FR" sz="1100" b="0" i="0" u="none" strike="noStrike">
-                        <a:solidFill>
-                          <a:srgbClr val="000000"/>
-                        </a:solidFill>
-                        <a:effectLst/>
-                        <a:latin typeface="Aptos Narrow" panose="020B0004020202020204" pitchFamily="34" charset="0"/>
-                      </a:endParaRPr>
                     </a:p>
                   </a:txBody>
                   <a:tcPr marL="7620" marR="7620" marT="7620" marB="0" anchor="b"/>
@@ -14514,18 +14467,15 @@
                     <a:p>
                       <a:pPr algn="r" fontAlgn="b"/>
                       <a:r>
-                        <a:rPr lang="fr-FR" sz="1100" u="none" strike="noStrike" dirty="0">
+                        <a:rPr lang="fr-FR" sz="1100" b="0" i="0" u="none" strike="noStrike" dirty="0">
+                          <a:solidFill>
+                            <a:srgbClr val="000000"/>
+                          </a:solidFill>
                           <a:effectLst/>
+                          <a:latin typeface="Aptos Narrow" panose="020B0004020202020204" pitchFamily="34" charset="0"/>
                         </a:rPr>
-                        <a:t>43,82%</a:t>
+                        <a:t>43,92%</a:t>
                       </a:r>
-                      <a:endParaRPr lang="fr-FR" sz="1100" b="0" i="0" u="none" strike="noStrike" dirty="0">
-                        <a:solidFill>
-                          <a:srgbClr val="000000"/>
-                        </a:solidFill>
-                        <a:effectLst/>
-                        <a:latin typeface="Aptos Narrow" panose="020B0004020202020204" pitchFamily="34" charset="0"/>
-                      </a:endParaRPr>
                     </a:p>
                   </a:txBody>
                   <a:tcPr marL="7620" marR="7620" marT="7620" marB="0" anchor="b"/>
@@ -14542,7 +14492,67 @@
       </p:graphicFrame>
       <p:graphicFrame>
         <p:nvGraphicFramePr>
-          <p:cNvPr id="11" name="Graphique 10">
+          <p:cNvPr id="3" name="Graphique 2">
+            <a:extLst>
+              <a:ext uri="{FF2B5EF4-FFF2-40B4-BE49-F238E27FC236}">
+                <a16:creationId xmlns:a16="http://schemas.microsoft.com/office/drawing/2014/main" id="{446746E4-7F34-638F-E7A0-A0F0F7AA0CE0}"/>
+              </a:ext>
+            </a:extLst>
+          </p:cNvPr>
+          <p:cNvGraphicFramePr>
+            <a:graphicFrameLocks/>
+          </p:cNvGraphicFramePr>
+          <p:nvPr>
+            <p:extLst>
+              <p:ext uri="{D42A27DB-BD31-4B8C-83A1-F6EECF244321}">
+                <p14:modId xmlns:p14="http://schemas.microsoft.com/office/powerpoint/2010/main" val="724722308"/>
+              </p:ext>
+            </p:extLst>
+          </p:nvPr>
+        </p:nvGraphicFramePr>
+        <p:xfrm>
+          <a:off x="7458959" y="300990"/>
+          <a:ext cx="4483248" cy="2715259"/>
+        </p:xfrm>
+        <a:graphic>
+          <a:graphicData uri="http://schemas.openxmlformats.org/drawingml/2006/chart">
+            <c:chart xmlns:c="http://schemas.openxmlformats.org/drawingml/2006/chart" xmlns:r="http://schemas.openxmlformats.org/officeDocument/2006/relationships" r:id="rId2"/>
+          </a:graphicData>
+        </a:graphic>
+      </p:graphicFrame>
+      <p:graphicFrame>
+        <p:nvGraphicFramePr>
+          <p:cNvPr id="4" name="Graphique 3">
+            <a:extLst>
+              <a:ext uri="{FF2B5EF4-FFF2-40B4-BE49-F238E27FC236}">
+                <a16:creationId xmlns:a16="http://schemas.microsoft.com/office/drawing/2014/main" id="{BCD09B29-5D9E-076F-14CB-81B6A61A03D9}"/>
+              </a:ext>
+            </a:extLst>
+          </p:cNvPr>
+          <p:cNvGraphicFramePr>
+            <a:graphicFrameLocks/>
+          </p:cNvGraphicFramePr>
+          <p:nvPr>
+            <p:extLst>
+              <p:ext uri="{D42A27DB-BD31-4B8C-83A1-F6EECF244321}">
+                <p14:modId xmlns:p14="http://schemas.microsoft.com/office/powerpoint/2010/main" val="1040305472"/>
+              </p:ext>
+            </p:extLst>
+          </p:nvPr>
+        </p:nvGraphicFramePr>
+        <p:xfrm>
+          <a:off x="7209167" y="3078958"/>
+          <a:ext cx="4982833" cy="2951479"/>
+        </p:xfrm>
+        <a:graphic>
+          <a:graphicData uri="http://schemas.openxmlformats.org/drawingml/2006/chart">
+            <c:chart xmlns:c="http://schemas.openxmlformats.org/drawingml/2006/chart" xmlns:r="http://schemas.openxmlformats.org/officeDocument/2006/relationships" r:id="rId3"/>
+          </a:graphicData>
+        </a:graphic>
+      </p:graphicFrame>
+      <p:graphicFrame>
+        <p:nvGraphicFramePr>
+          <p:cNvPr id="6" name="Graphique 5">
             <a:extLst>
               <a:ext uri="{FF2B5EF4-FFF2-40B4-BE49-F238E27FC236}">
                 <a16:creationId xmlns:a16="http://schemas.microsoft.com/office/drawing/2014/main" id="{B14E7F09-2061-A607-2A7E-715444EA8E6A}"/>
@@ -14555,74 +14565,14 @@
           <p:nvPr>
             <p:extLst>
               <p:ext uri="{D42A27DB-BD31-4B8C-83A1-F6EECF244321}">
-                <p14:modId xmlns:p14="http://schemas.microsoft.com/office/powerpoint/2010/main" val="1840391580"/>
+                <p14:modId xmlns:p14="http://schemas.microsoft.com/office/powerpoint/2010/main" val="4096300488"/>
               </p:ext>
             </p:extLst>
           </p:nvPr>
         </p:nvGraphicFramePr>
         <p:xfrm>
-          <a:off x="940198" y="3078957"/>
-          <a:ext cx="6374605" cy="2951480"/>
-        </p:xfrm>
-        <a:graphic>
-          <a:graphicData uri="http://schemas.openxmlformats.org/drawingml/2006/chart">
-            <c:chart xmlns:c="http://schemas.openxmlformats.org/drawingml/2006/chart" xmlns:r="http://schemas.openxmlformats.org/officeDocument/2006/relationships" r:id="rId2"/>
-          </a:graphicData>
-        </a:graphic>
-      </p:graphicFrame>
-      <p:graphicFrame>
-        <p:nvGraphicFramePr>
-          <p:cNvPr id="15" name="Graphique 14">
-            <a:extLst>
-              <a:ext uri="{FF2B5EF4-FFF2-40B4-BE49-F238E27FC236}">
-                <a16:creationId xmlns:a16="http://schemas.microsoft.com/office/drawing/2014/main" id="{446746E4-7F34-638F-E7A0-A0F0F7AA0CE0}"/>
-              </a:ext>
-            </a:extLst>
-          </p:cNvPr>
-          <p:cNvGraphicFramePr>
-            <a:graphicFrameLocks/>
-          </p:cNvGraphicFramePr>
-          <p:nvPr>
-            <p:extLst>
-              <p:ext uri="{D42A27DB-BD31-4B8C-83A1-F6EECF244321}">
-                <p14:modId xmlns:p14="http://schemas.microsoft.com/office/powerpoint/2010/main" val="885166406"/>
-              </p:ext>
-            </p:extLst>
-          </p:nvPr>
-        </p:nvGraphicFramePr>
-        <p:xfrm>
-          <a:off x="8023861" y="564357"/>
-          <a:ext cx="3329939" cy="2514600"/>
-        </p:xfrm>
-        <a:graphic>
-          <a:graphicData uri="http://schemas.openxmlformats.org/drawingml/2006/chart">
-            <c:chart xmlns:c="http://schemas.openxmlformats.org/drawingml/2006/chart" xmlns:r="http://schemas.openxmlformats.org/officeDocument/2006/relationships" r:id="rId3"/>
-          </a:graphicData>
-        </a:graphic>
-      </p:graphicFrame>
-      <p:graphicFrame>
-        <p:nvGraphicFramePr>
-          <p:cNvPr id="16" name="Graphique 15">
-            <a:extLst>
-              <a:ext uri="{FF2B5EF4-FFF2-40B4-BE49-F238E27FC236}">
-                <a16:creationId xmlns:a16="http://schemas.microsoft.com/office/drawing/2014/main" id="{BCD09B29-5D9E-076F-14CB-81B6A61A03D9}"/>
-              </a:ext>
-            </a:extLst>
-          </p:cNvPr>
-          <p:cNvGraphicFramePr>
-            <a:graphicFrameLocks/>
-          </p:cNvGraphicFramePr>
-          <p:nvPr>
-            <p:extLst>
-              <p:ext uri="{D42A27DB-BD31-4B8C-83A1-F6EECF244321}">
-                <p14:modId xmlns:p14="http://schemas.microsoft.com/office/powerpoint/2010/main" val="1330427368"/>
-              </p:ext>
-            </p:extLst>
-          </p:nvPr>
-        </p:nvGraphicFramePr>
-        <p:xfrm>
-          <a:off x="7535386" y="3078957"/>
-          <a:ext cx="4306887" cy="2879697"/>
+          <a:off x="940198" y="3342968"/>
+          <a:ext cx="6374604" cy="2687469"/>
         </p:xfrm>
         <a:graphic>
           <a:graphicData uri="http://schemas.openxmlformats.org/drawingml/2006/chart">

</xml_diff>